<commit_message>
loss calculations, for 2L and 3L converters
</commit_message>
<xml_diff>
--- a/Weekly-Reports/HolisticDesing.pptx
+++ b/Weekly-Reports/HolisticDesing.pptx
@@ -111,6 +111,11 @@
       </a:defRPr>
     </a:lvl9pPr>
   </p:defaultTextStyle>
+  <p:extLst>
+    <p:ext uri="{EFAFB233-063F-42B5-8137-9DF3F51BA10A}">
+      <p15:sldGuideLst xmlns:p15="http://schemas.microsoft.com/office/powerpoint/2012/main"/>
+    </p:ext>
+  </p:extLst>
 </p:presentation>
 </file>
 
@@ -3573,7 +3578,6 @@
               <a:rPr lang="en-US" sz="2200" dirty="0" smtClean="0"/>
               <a:t>Losses/Efficiency (99.5%)</a:t>
             </a:r>
-            <a:endParaRPr lang="en-US" sz="2200" dirty="0" smtClean="0"/>
           </a:p>
           <a:p>
             <a:pPr marL="0" indent="0" algn="just">
@@ -3980,8 +3984,8 @@
           </a:p>
         </p:txBody>
       </p:sp>
-      <mc:AlternateContent xmlns:mc="http://schemas.openxmlformats.org/markup-compatibility/2006">
-        <mc:Choice xmlns:a14="http://schemas.microsoft.com/office/drawing/2010/main" Requires="a14">
+      <mc:AlternateContent xmlns:mc="http://schemas.openxmlformats.org/markup-compatibility/2006" xmlns:a14="http://schemas.microsoft.com/office/drawing/2010/main">
+        <mc:Choice Requires="a14">
           <p:sp>
             <p:nvSpPr>
               <p:cNvPr id="5" name="Content Placeholder 2"/>
@@ -4284,7 +4288,6 @@
                   <a:rPr lang="sv-SE" sz="1900" dirty="0" smtClean="0"/>
                   <a:t>   </a:t>
                 </a:r>
-                <a:endParaRPr lang="sv-SE" sz="1900" dirty="0" smtClean="0"/>
               </a:p>
               <a:p>
                 <a:pPr marL="514350" indent="-514350">
@@ -4708,7 +4711,7 @@
             </p:txBody>
           </p:sp>
         </mc:Choice>
-        <mc:Fallback>
+        <mc:Fallback xmlns="">
           <p:sp>
             <p:nvSpPr>
               <p:cNvPr id="5" name="Content Placeholder 2"/>
@@ -4854,23 +4857,7 @@
             </a:pPr>
             <a:r>
               <a:rPr lang="en-US" sz="1700" dirty="0" smtClean="0"/>
-              <a:t>Power semiconductors </a:t>
-            </a:r>
-            <a:r>
-              <a:rPr lang="en-US" sz="1700" dirty="0" smtClean="0"/>
-              <a:t>(</a:t>
-            </a:r>
-            <a:r>
-              <a:rPr lang="en-US" sz="1700" dirty="0" smtClean="0"/>
-              <a:t>90</a:t>
-            </a:r>
-            <a:r>
-              <a:rPr lang="en-US" sz="1700" dirty="0" smtClean="0"/>
-              <a:t> </a:t>
-            </a:r>
-            <a:r>
-              <a:rPr lang="en-US" sz="1700" dirty="0" smtClean="0"/>
-              <a:t>%) </a:t>
+              <a:t>Power semiconductors (90 %) </a:t>
             </a:r>
             <a:r>
               <a:rPr lang="en-US" sz="1700" dirty="0"/>
@@ -4921,13 +4908,8 @@
             </a:pPr>
             <a:r>
               <a:rPr lang="en-US" sz="1700" dirty="0" smtClean="0"/>
-              <a:t>Additional Losses  ( </a:t>
-            </a:r>
-            <a:r>
-              <a:rPr lang="en-US" sz="1700" dirty="0" smtClean="0"/>
-              <a:t>10%)</a:t>
-            </a:r>
-            <a:endParaRPr lang="en-US" sz="1700" dirty="0" smtClean="0"/>
+              <a:t>Additional Losses  ( 10%)</a:t>
+            </a:r>
           </a:p>
           <a:p>
             <a:pPr lvl="1"/>
@@ -5155,11 +5137,7 @@
             </a:r>
             <a:r>
               <a:rPr lang="en-US" sz="1600" dirty="0" smtClean="0"/>
-              <a:t>Module (12</a:t>
-            </a:r>
-            <a:r>
-              <a:rPr lang="en-US" sz="1600" dirty="0" smtClean="0"/>
-              <a:t>%)</a:t>
+              <a:t>Module (12%)</a:t>
             </a:r>
             <a:endParaRPr lang="en-US" sz="1600" dirty="0"/>
           </a:p>
@@ -5174,11 +5152,7 @@
             </a:r>
             <a:r>
               <a:rPr lang="en-US" sz="1600" dirty="0" smtClean="0"/>
-              <a:t>Drives (3</a:t>
-            </a:r>
-            <a:r>
-              <a:rPr lang="en-US" sz="1600" dirty="0" smtClean="0"/>
-              <a:t>%)</a:t>
+              <a:t>Drives (3%)</a:t>
             </a:r>
             <a:endParaRPr lang="en-US" sz="1600" dirty="0"/>
           </a:p>
@@ -5189,15 +5163,7 @@
             </a:pPr>
             <a:r>
               <a:rPr lang="en-US" sz="1600" dirty="0" smtClean="0"/>
-              <a:t>Capacitor </a:t>
-            </a:r>
-            <a:r>
-              <a:rPr lang="en-US" sz="1600" dirty="0" smtClean="0"/>
-              <a:t>(24 </a:t>
-            </a:r>
-            <a:r>
-              <a:rPr lang="en-US" sz="1600" dirty="0" smtClean="0"/>
-              <a:t>%)</a:t>
+              <a:t>Capacitor (24 %)</a:t>
             </a:r>
             <a:endParaRPr lang="en-US" sz="1600" dirty="0"/>
           </a:p>
@@ -5224,7 +5190,6 @@
               <a:rPr lang="en-US" sz="1600" dirty="0" smtClean="0"/>
               <a:t>Heatsink</a:t>
             </a:r>
-            <a:endParaRPr lang="en-US" sz="1600" dirty="0" smtClean="0"/>
           </a:p>
           <a:p>
             <a:pPr marL="342900" indent="-342900">
@@ -5466,15 +5431,7 @@
                   <a:srgbClr val="C00000"/>
                 </a:solidFill>
               </a:rPr>
-              <a:t>Loss and Volume </a:t>
-            </a:r>
-            <a:r>
-              <a:rPr lang="en-US" sz="3600" dirty="0" smtClean="0">
-                <a:solidFill>
-                  <a:srgbClr val="C00000"/>
-                </a:solidFill>
-              </a:rPr>
-              <a:t>Breakdowns \ Considered Topologies [2,3]</a:t>
+              <a:t>Loss and Volume Breakdowns \ Considered Topologies [2,3]</a:t>
             </a:r>
             <a:endParaRPr lang="sv-SE" sz="3600" dirty="0">
               <a:solidFill>
@@ -6004,15 +5961,7 @@
                   <a:srgbClr val="C00000"/>
                 </a:solidFill>
               </a:rPr>
-              <a:t>Stepwise Design Methodology and Multi-objective Optimization </a:t>
-            </a:r>
-            <a:r>
-              <a:rPr lang="en-US" dirty="0" smtClean="0">
-                <a:solidFill>
-                  <a:srgbClr val="C00000"/>
-                </a:solidFill>
-              </a:rPr>
-              <a:t>[4,5]</a:t>
+              <a:t>Stepwise Design Methodology and Multi-objective Optimization [4,5]</a:t>
             </a:r>
             <a:endParaRPr lang="sv-SE" dirty="0">
               <a:solidFill>
@@ -6304,11 +6253,7 @@
             </a:pPr>
             <a:r>
               <a:rPr lang="en-US" dirty="0" smtClean="0"/>
-              <a:t>Power ratings (Voltage, Current</a:t>
-            </a:r>
-            <a:r>
-              <a:rPr lang="en-US" dirty="0" smtClean="0"/>
-              <a:t>)</a:t>
+              <a:t>Power ratings (Voltage, Current)</a:t>
             </a:r>
           </a:p>
         </p:txBody>

</xml_diff>